<commit_message>
Improve tetrix, add pyramid
</commit_message>
<xml_diff>
--- a/docs/assets/fractals/3d/tetrix.pptx
+++ b/docs/assets/fractals/3d/tetrix.pptx
@@ -243,7 +243,7 @@
           <a:p>
             <a:fld id="{42147EE6-B061-CA4C-8D4E-EDA22BD3332D}" type="datetimeFigureOut">
               <a:rPr lang="en-GB" smtClean="0"/>
-              <a:t>25/08/2024</a:t>
+              <a:t>13/10/2024</a:t>
             </a:fld>
             <a:endParaRPr lang="en-GB"/>
           </a:p>
@@ -413,7 +413,7 @@
           <a:p>
             <a:fld id="{42147EE6-B061-CA4C-8D4E-EDA22BD3332D}" type="datetimeFigureOut">
               <a:rPr lang="en-GB" smtClean="0"/>
-              <a:t>25/08/2024</a:t>
+              <a:t>13/10/2024</a:t>
             </a:fld>
             <a:endParaRPr lang="en-GB"/>
           </a:p>
@@ -593,7 +593,7 @@
           <a:p>
             <a:fld id="{42147EE6-B061-CA4C-8D4E-EDA22BD3332D}" type="datetimeFigureOut">
               <a:rPr lang="en-GB" smtClean="0"/>
-              <a:t>25/08/2024</a:t>
+              <a:t>13/10/2024</a:t>
             </a:fld>
             <a:endParaRPr lang="en-GB"/>
           </a:p>
@@ -763,7 +763,7 @@
           <a:p>
             <a:fld id="{42147EE6-B061-CA4C-8D4E-EDA22BD3332D}" type="datetimeFigureOut">
               <a:rPr lang="en-GB" smtClean="0"/>
-              <a:t>25/08/2024</a:t>
+              <a:t>13/10/2024</a:t>
             </a:fld>
             <a:endParaRPr lang="en-GB"/>
           </a:p>
@@ -1007,7 +1007,7 @@
           <a:p>
             <a:fld id="{42147EE6-B061-CA4C-8D4E-EDA22BD3332D}" type="datetimeFigureOut">
               <a:rPr lang="en-GB" smtClean="0"/>
-              <a:t>25/08/2024</a:t>
+              <a:t>13/10/2024</a:t>
             </a:fld>
             <a:endParaRPr lang="en-GB"/>
           </a:p>
@@ -1239,7 +1239,7 @@
           <a:p>
             <a:fld id="{42147EE6-B061-CA4C-8D4E-EDA22BD3332D}" type="datetimeFigureOut">
               <a:rPr lang="en-GB" smtClean="0"/>
-              <a:t>25/08/2024</a:t>
+              <a:t>13/10/2024</a:t>
             </a:fld>
             <a:endParaRPr lang="en-GB"/>
           </a:p>
@@ -1606,7 +1606,7 @@
           <a:p>
             <a:fld id="{42147EE6-B061-CA4C-8D4E-EDA22BD3332D}" type="datetimeFigureOut">
               <a:rPr lang="en-GB" smtClean="0"/>
-              <a:t>25/08/2024</a:t>
+              <a:t>13/10/2024</a:t>
             </a:fld>
             <a:endParaRPr lang="en-GB"/>
           </a:p>
@@ -1724,7 +1724,7 @@
           <a:p>
             <a:fld id="{42147EE6-B061-CA4C-8D4E-EDA22BD3332D}" type="datetimeFigureOut">
               <a:rPr lang="en-GB" smtClean="0"/>
-              <a:t>25/08/2024</a:t>
+              <a:t>13/10/2024</a:t>
             </a:fld>
             <a:endParaRPr lang="en-GB"/>
           </a:p>
@@ -1819,7 +1819,7 @@
           <a:p>
             <a:fld id="{42147EE6-B061-CA4C-8D4E-EDA22BD3332D}" type="datetimeFigureOut">
               <a:rPr lang="en-GB" smtClean="0"/>
-              <a:t>25/08/2024</a:t>
+              <a:t>13/10/2024</a:t>
             </a:fld>
             <a:endParaRPr lang="en-GB"/>
           </a:p>
@@ -2096,7 +2096,7 @@
           <a:p>
             <a:fld id="{42147EE6-B061-CA4C-8D4E-EDA22BD3332D}" type="datetimeFigureOut">
               <a:rPr lang="en-GB" smtClean="0"/>
-              <a:t>25/08/2024</a:t>
+              <a:t>13/10/2024</a:t>
             </a:fld>
             <a:endParaRPr lang="en-GB"/>
           </a:p>
@@ -2353,7 +2353,7 @@
           <a:p>
             <a:fld id="{42147EE6-B061-CA4C-8D4E-EDA22BD3332D}" type="datetimeFigureOut">
               <a:rPr lang="en-GB" smtClean="0"/>
-              <a:t>25/08/2024</a:t>
+              <a:t>13/10/2024</a:t>
             </a:fld>
             <a:endParaRPr lang="en-GB"/>
           </a:p>
@@ -2566,7 +2566,7 @@
           <a:p>
             <a:fld id="{42147EE6-B061-CA4C-8D4E-EDA22BD3332D}" type="datetimeFigureOut">
               <a:rPr lang="en-GB" smtClean="0"/>
-              <a:t>25/08/2024</a:t>
+              <a:t>13/10/2024</a:t>
             </a:fld>
             <a:endParaRPr lang="en-GB"/>
           </a:p>
@@ -2973,10 +2973,10 @@
       </p:grpSpPr>
       <p:sp>
         <p:nvSpPr>
-          <p:cNvPr id="2" name="Freeform 1">
+          <p:cNvPr id="13" name="Freeform 12">
             <a:extLst>
               <a:ext uri="{FF2B5EF4-FFF2-40B4-BE49-F238E27FC236}">
-                <a16:creationId xmlns:a16="http://schemas.microsoft.com/office/drawing/2014/main" id="{36AFDF08-4D8F-357C-51FF-6CC5F5A75594}"/>
+                <a16:creationId xmlns:a16="http://schemas.microsoft.com/office/drawing/2014/main" id="{331D495E-F215-B183-19F8-810219DBFF92}"/>
               </a:ext>
             </a:extLst>
           </p:cNvPr>
@@ -2985,8 +2985,8 @@
         </p:nvSpPr>
         <p:spPr>
           <a:xfrm>
-            <a:off x="1403531" y="1410789"/>
-            <a:ext cx="5374603" cy="4602591"/>
+            <a:off x="1017923" y="4950169"/>
+            <a:ext cx="6396383" cy="3299143"/>
           </a:xfrm>
           <a:custGeom>
             <a:avLst/>
@@ -3031,6 +3031,102 @@
               <a:gd name="connsiteY2" fmla="*/ 4602591 h 4602591"/>
               <a:gd name="connsiteX3" fmla="*/ 2737395 w 5374603"/>
               <a:gd name="connsiteY3" fmla="*/ 0 h 4602591"/>
+              <a:gd name="connsiteX0" fmla="*/ 2763363 w 5400571"/>
+              <a:gd name="connsiteY0" fmla="*/ 0 h 4602591"/>
+              <a:gd name="connsiteX1" fmla="*/ 0 w 5400571"/>
+              <a:gd name="connsiteY1" fmla="*/ 4024480 h 4602591"/>
+              <a:gd name="connsiteX2" fmla="*/ 5400571 w 5400571"/>
+              <a:gd name="connsiteY2" fmla="*/ 4602591 h 4602591"/>
+              <a:gd name="connsiteX3" fmla="*/ 2763363 w 5400571"/>
+              <a:gd name="connsiteY3" fmla="*/ 0 h 4602591"/>
+              <a:gd name="connsiteX0" fmla="*/ 2711426 w 5400571"/>
+              <a:gd name="connsiteY0" fmla="*/ 0 h 4558109"/>
+              <a:gd name="connsiteX1" fmla="*/ 0 w 5400571"/>
+              <a:gd name="connsiteY1" fmla="*/ 3979998 h 4558109"/>
+              <a:gd name="connsiteX2" fmla="*/ 5400571 w 5400571"/>
+              <a:gd name="connsiteY2" fmla="*/ 4558109 h 4558109"/>
+              <a:gd name="connsiteX3" fmla="*/ 2711426 w 5400571"/>
+              <a:gd name="connsiteY3" fmla="*/ 0 h 4558109"/>
+              <a:gd name="connsiteX0" fmla="*/ 2711426 w 5283713"/>
+              <a:gd name="connsiteY0" fmla="*/ 0 h 4513626"/>
+              <a:gd name="connsiteX1" fmla="*/ 0 w 5283713"/>
+              <a:gd name="connsiteY1" fmla="*/ 3979998 h 4513626"/>
+              <a:gd name="connsiteX2" fmla="*/ 5283713 w 5283713"/>
+              <a:gd name="connsiteY2" fmla="*/ 4513626 h 4513626"/>
+              <a:gd name="connsiteX3" fmla="*/ 2711426 w 5283713"/>
+              <a:gd name="connsiteY3" fmla="*/ 0 h 4513626"/>
+              <a:gd name="connsiteX0" fmla="*/ 2699376 w 5271663"/>
+              <a:gd name="connsiteY0" fmla="*/ 0 h 4513626"/>
+              <a:gd name="connsiteX1" fmla="*/ 0 w 5271663"/>
+              <a:gd name="connsiteY1" fmla="*/ 3993758 h 4513626"/>
+              <a:gd name="connsiteX2" fmla="*/ 5271663 w 5271663"/>
+              <a:gd name="connsiteY2" fmla="*/ 4513626 h 4513626"/>
+              <a:gd name="connsiteX3" fmla="*/ 2699376 w 5271663"/>
+              <a:gd name="connsiteY3" fmla="*/ 0 h 4513626"/>
+              <a:gd name="connsiteX0" fmla="*/ 2759623 w 5271663"/>
+              <a:gd name="connsiteY0" fmla="*/ 0 h 4499866"/>
+              <a:gd name="connsiteX1" fmla="*/ 0 w 5271663"/>
+              <a:gd name="connsiteY1" fmla="*/ 3979998 h 4499866"/>
+              <a:gd name="connsiteX2" fmla="*/ 5271663 w 5271663"/>
+              <a:gd name="connsiteY2" fmla="*/ 4499866 h 4499866"/>
+              <a:gd name="connsiteX3" fmla="*/ 2759623 w 5271663"/>
+              <a:gd name="connsiteY3" fmla="*/ 0 h 4499866"/>
+              <a:gd name="connsiteX0" fmla="*/ 2759623 w 5292749"/>
+              <a:gd name="connsiteY0" fmla="*/ 0 h 4510186"/>
+              <a:gd name="connsiteX1" fmla="*/ 0 w 5292749"/>
+              <a:gd name="connsiteY1" fmla="*/ 3979998 h 4510186"/>
+              <a:gd name="connsiteX2" fmla="*/ 5292749 w 5292749"/>
+              <a:gd name="connsiteY2" fmla="*/ 4510186 h 4510186"/>
+              <a:gd name="connsiteX3" fmla="*/ 2759623 w 5292749"/>
+              <a:gd name="connsiteY3" fmla="*/ 0 h 4510186"/>
+              <a:gd name="connsiteX0" fmla="*/ 0 w 5456861"/>
+              <a:gd name="connsiteY0" fmla="*/ 0 h 1778418"/>
+              <a:gd name="connsiteX1" fmla="*/ 164112 w 5456861"/>
+              <a:gd name="connsiteY1" fmla="*/ 1248230 h 1778418"/>
+              <a:gd name="connsiteX2" fmla="*/ 5456861 w 5456861"/>
+              <a:gd name="connsiteY2" fmla="*/ 1778418 h 1778418"/>
+              <a:gd name="connsiteX3" fmla="*/ 0 w 5456861"/>
+              <a:gd name="connsiteY3" fmla="*/ 0 h 1778418"/>
+              <a:gd name="connsiteX0" fmla="*/ 0 w 5279665"/>
+              <a:gd name="connsiteY0" fmla="*/ 0 h 1248230"/>
+              <a:gd name="connsiteX1" fmla="*/ 164112 w 5279665"/>
+              <a:gd name="connsiteY1" fmla="*/ 1248230 h 1248230"/>
+              <a:gd name="connsiteX2" fmla="*/ 5279665 w 5279665"/>
+              <a:gd name="connsiteY2" fmla="*/ 581162 h 1248230"/>
+              <a:gd name="connsiteX3" fmla="*/ 0 w 5279665"/>
+              <a:gd name="connsiteY3" fmla="*/ 0 h 1248230"/>
+              <a:gd name="connsiteX0" fmla="*/ 0 w 5279665"/>
+              <a:gd name="connsiteY0" fmla="*/ 0 h 3069409"/>
+              <a:gd name="connsiteX1" fmla="*/ 2098502 w 5279665"/>
+              <a:gd name="connsiteY1" fmla="*/ 3069409 h 3069409"/>
+              <a:gd name="connsiteX2" fmla="*/ 5279665 w 5279665"/>
+              <a:gd name="connsiteY2" fmla="*/ 581162 h 3069409"/>
+              <a:gd name="connsiteX3" fmla="*/ 0 w 5279665"/>
+              <a:gd name="connsiteY3" fmla="*/ 0 h 3069409"/>
+              <a:gd name="connsiteX0" fmla="*/ 0 w 5314828"/>
+              <a:gd name="connsiteY0" fmla="*/ 0 h 3069409"/>
+              <a:gd name="connsiteX1" fmla="*/ 2098502 w 5314828"/>
+              <a:gd name="connsiteY1" fmla="*/ 3069409 h 3069409"/>
+              <a:gd name="connsiteX2" fmla="*/ 5314828 w 5314828"/>
+              <a:gd name="connsiteY2" fmla="*/ 544352 h 3069409"/>
+              <a:gd name="connsiteX3" fmla="*/ 0 w 5314828"/>
+              <a:gd name="connsiteY3" fmla="*/ 0 h 3069409"/>
+              <a:gd name="connsiteX0" fmla="*/ 0 w 5267944"/>
+              <a:gd name="connsiteY0" fmla="*/ 0 h 3049331"/>
+              <a:gd name="connsiteX1" fmla="*/ 2051618 w 5267944"/>
+              <a:gd name="connsiteY1" fmla="*/ 3049331 h 3049331"/>
+              <a:gd name="connsiteX2" fmla="*/ 5267944 w 5267944"/>
+              <a:gd name="connsiteY2" fmla="*/ 524274 h 3049331"/>
+              <a:gd name="connsiteX3" fmla="*/ 0 w 5267944"/>
+              <a:gd name="connsiteY3" fmla="*/ 0 h 3049331"/>
+              <a:gd name="connsiteX0" fmla="*/ 0 w 5267944"/>
+              <a:gd name="connsiteY0" fmla="*/ 0 h 3102872"/>
+              <a:gd name="connsiteX1" fmla="*/ 2080921 w 5267944"/>
+              <a:gd name="connsiteY1" fmla="*/ 3102872 h 3102872"/>
+              <a:gd name="connsiteX2" fmla="*/ 5267944 w 5267944"/>
+              <a:gd name="connsiteY2" fmla="*/ 524274 h 3102872"/>
+              <a:gd name="connsiteX3" fmla="*/ 0 w 5267944"/>
+              <a:gd name="connsiteY3" fmla="*/ 0 h 3102872"/>
             </a:gdLst>
             <a:ahLst/>
             <a:cxnLst>
@@ -3049,27 +3145,29 @@
             </a:cxnLst>
             <a:rect l="l" t="t" r="r" b="b"/>
             <a:pathLst>
-              <a:path w="5374603" h="4602591">
+              <a:path w="5267944" h="3102872">
                 <a:moveTo>
-                  <a:pt x="2737395" y="0"/>
+                  <a:pt x="0" y="0"/>
                 </a:moveTo>
                 <a:lnTo>
-                  <a:pt x="0" y="3816894"/>
+                  <a:pt x="2080921" y="3102872"/>
                 </a:lnTo>
                 <a:lnTo>
-                  <a:pt x="5374603" y="4602591"/>
+                  <a:pt x="5267944" y="524274"/>
                 </a:lnTo>
                 <a:lnTo>
-                  <a:pt x="2737395" y="0"/>
+                  <a:pt x="0" y="0"/>
                 </a:lnTo>
                 <a:close/>
               </a:path>
             </a:pathLst>
           </a:custGeom>
           <a:solidFill>
-            <a:srgbClr val="4472C4">
-              <a:alpha val="20000"/>
-            </a:srgbClr>
+            <a:schemeClr val="tx1">
+              <a:lumMod val="85000"/>
+              <a:lumOff val="15000"/>
+              <a:alpha val="15000"/>
+            </a:schemeClr>
           </a:solidFill>
           <a:ln>
             <a:noFill/>
@@ -3100,6 +3198,185 @@
           </a:p>
         </p:txBody>
       </p:sp>
+      <p:sp>
+        <p:nvSpPr>
+          <p:cNvPr id="9" name="Freeform 8">
+            <a:extLst>
+              <a:ext uri="{FF2B5EF4-FFF2-40B4-BE49-F238E27FC236}">
+                <a16:creationId xmlns:a16="http://schemas.microsoft.com/office/drawing/2014/main" id="{AE3C6229-F8B9-797D-2896-F2BFB98C7C5B}"/>
+              </a:ext>
+            </a:extLst>
+          </p:cNvPr>
+          <p:cNvSpPr/>
+          <p:nvPr/>
+        </p:nvSpPr>
+        <p:spPr>
+          <a:xfrm>
+            <a:off x="1007862" y="724376"/>
+            <a:ext cx="6426502" cy="4795476"/>
+          </a:xfrm>
+          <a:custGeom>
+            <a:avLst/>
+            <a:gdLst>
+              <a:gd name="connsiteX0" fmla="*/ 2076995 w 4140926"/>
+              <a:gd name="connsiteY0" fmla="*/ 0 h 5172891"/>
+              <a:gd name="connsiteX1" fmla="*/ 0 w 4140926"/>
+              <a:gd name="connsiteY1" fmla="*/ 4362994 h 5172891"/>
+              <a:gd name="connsiteX2" fmla="*/ 4140926 w 4140926"/>
+              <a:gd name="connsiteY2" fmla="*/ 5172891 h 5172891"/>
+              <a:gd name="connsiteX3" fmla="*/ 2076995 w 4140926"/>
+              <a:gd name="connsiteY3" fmla="*/ 0 h 5172891"/>
+              <a:gd name="connsiteX0" fmla="*/ 2076995 w 4702629"/>
+              <a:gd name="connsiteY0" fmla="*/ 0 h 4637314"/>
+              <a:gd name="connsiteX1" fmla="*/ 0 w 4702629"/>
+              <a:gd name="connsiteY1" fmla="*/ 4362994 h 4637314"/>
+              <a:gd name="connsiteX2" fmla="*/ 4702629 w 4702629"/>
+              <a:gd name="connsiteY2" fmla="*/ 4637314 h 4637314"/>
+              <a:gd name="connsiteX3" fmla="*/ 2076995 w 4702629"/>
+              <a:gd name="connsiteY3" fmla="*/ 0 h 4637314"/>
+              <a:gd name="connsiteX0" fmla="*/ 2076995 w 4806801"/>
+              <a:gd name="connsiteY0" fmla="*/ 0 h 4452120"/>
+              <a:gd name="connsiteX1" fmla="*/ 0 w 4806801"/>
+              <a:gd name="connsiteY1" fmla="*/ 4362994 h 4452120"/>
+              <a:gd name="connsiteX2" fmla="*/ 4806801 w 4806801"/>
+              <a:gd name="connsiteY2" fmla="*/ 4452120 h 4452120"/>
+              <a:gd name="connsiteX3" fmla="*/ 2076995 w 4806801"/>
+              <a:gd name="connsiteY3" fmla="*/ 0 h 4452120"/>
+              <a:gd name="connsiteX0" fmla="*/ 2076995 w 4714203"/>
+              <a:gd name="connsiteY0" fmla="*/ 0 h 4602591"/>
+              <a:gd name="connsiteX1" fmla="*/ 0 w 4714203"/>
+              <a:gd name="connsiteY1" fmla="*/ 4362994 h 4602591"/>
+              <a:gd name="connsiteX2" fmla="*/ 4714203 w 4714203"/>
+              <a:gd name="connsiteY2" fmla="*/ 4602591 h 4602591"/>
+              <a:gd name="connsiteX3" fmla="*/ 2076995 w 4714203"/>
+              <a:gd name="connsiteY3" fmla="*/ 0 h 4602591"/>
+              <a:gd name="connsiteX0" fmla="*/ 2737395 w 5374603"/>
+              <a:gd name="connsiteY0" fmla="*/ 0 h 4602591"/>
+              <a:gd name="connsiteX1" fmla="*/ 0 w 5374603"/>
+              <a:gd name="connsiteY1" fmla="*/ 3816894 h 4602591"/>
+              <a:gd name="connsiteX2" fmla="*/ 5374603 w 5374603"/>
+              <a:gd name="connsiteY2" fmla="*/ 4602591 h 4602591"/>
+              <a:gd name="connsiteX3" fmla="*/ 2737395 w 5374603"/>
+              <a:gd name="connsiteY3" fmla="*/ 0 h 4602591"/>
+              <a:gd name="connsiteX0" fmla="*/ 2763363 w 5400571"/>
+              <a:gd name="connsiteY0" fmla="*/ 0 h 4602591"/>
+              <a:gd name="connsiteX1" fmla="*/ 0 w 5400571"/>
+              <a:gd name="connsiteY1" fmla="*/ 4024480 h 4602591"/>
+              <a:gd name="connsiteX2" fmla="*/ 5400571 w 5400571"/>
+              <a:gd name="connsiteY2" fmla="*/ 4602591 h 4602591"/>
+              <a:gd name="connsiteX3" fmla="*/ 2763363 w 5400571"/>
+              <a:gd name="connsiteY3" fmla="*/ 0 h 4602591"/>
+              <a:gd name="connsiteX0" fmla="*/ 2711426 w 5400571"/>
+              <a:gd name="connsiteY0" fmla="*/ 0 h 4558109"/>
+              <a:gd name="connsiteX1" fmla="*/ 0 w 5400571"/>
+              <a:gd name="connsiteY1" fmla="*/ 3979998 h 4558109"/>
+              <a:gd name="connsiteX2" fmla="*/ 5400571 w 5400571"/>
+              <a:gd name="connsiteY2" fmla="*/ 4558109 h 4558109"/>
+              <a:gd name="connsiteX3" fmla="*/ 2711426 w 5400571"/>
+              <a:gd name="connsiteY3" fmla="*/ 0 h 4558109"/>
+              <a:gd name="connsiteX0" fmla="*/ 2711426 w 5283713"/>
+              <a:gd name="connsiteY0" fmla="*/ 0 h 4513626"/>
+              <a:gd name="connsiteX1" fmla="*/ 0 w 5283713"/>
+              <a:gd name="connsiteY1" fmla="*/ 3979998 h 4513626"/>
+              <a:gd name="connsiteX2" fmla="*/ 5283713 w 5283713"/>
+              <a:gd name="connsiteY2" fmla="*/ 4513626 h 4513626"/>
+              <a:gd name="connsiteX3" fmla="*/ 2711426 w 5283713"/>
+              <a:gd name="connsiteY3" fmla="*/ 0 h 4513626"/>
+              <a:gd name="connsiteX0" fmla="*/ 2699376 w 5271663"/>
+              <a:gd name="connsiteY0" fmla="*/ 0 h 4513626"/>
+              <a:gd name="connsiteX1" fmla="*/ 0 w 5271663"/>
+              <a:gd name="connsiteY1" fmla="*/ 3993758 h 4513626"/>
+              <a:gd name="connsiteX2" fmla="*/ 5271663 w 5271663"/>
+              <a:gd name="connsiteY2" fmla="*/ 4513626 h 4513626"/>
+              <a:gd name="connsiteX3" fmla="*/ 2699376 w 5271663"/>
+              <a:gd name="connsiteY3" fmla="*/ 0 h 4513626"/>
+              <a:gd name="connsiteX0" fmla="*/ 2759623 w 5271663"/>
+              <a:gd name="connsiteY0" fmla="*/ 0 h 4499866"/>
+              <a:gd name="connsiteX1" fmla="*/ 0 w 5271663"/>
+              <a:gd name="connsiteY1" fmla="*/ 3979998 h 4499866"/>
+              <a:gd name="connsiteX2" fmla="*/ 5271663 w 5271663"/>
+              <a:gd name="connsiteY2" fmla="*/ 4499866 h 4499866"/>
+              <a:gd name="connsiteX3" fmla="*/ 2759623 w 5271663"/>
+              <a:gd name="connsiteY3" fmla="*/ 0 h 4499866"/>
+              <a:gd name="connsiteX0" fmla="*/ 2759623 w 5292749"/>
+              <a:gd name="connsiteY0" fmla="*/ 0 h 4510186"/>
+              <a:gd name="connsiteX1" fmla="*/ 0 w 5292749"/>
+              <a:gd name="connsiteY1" fmla="*/ 3979998 h 4510186"/>
+              <a:gd name="connsiteX2" fmla="*/ 5292749 w 5292749"/>
+              <a:gd name="connsiteY2" fmla="*/ 4510186 h 4510186"/>
+              <a:gd name="connsiteX3" fmla="*/ 2759623 w 5292749"/>
+              <a:gd name="connsiteY3" fmla="*/ 0 h 4510186"/>
+            </a:gdLst>
+            <a:ahLst/>
+            <a:cxnLst>
+              <a:cxn ang="0">
+                <a:pos x="connsiteX0" y="connsiteY0"/>
+              </a:cxn>
+              <a:cxn ang="0">
+                <a:pos x="connsiteX1" y="connsiteY1"/>
+              </a:cxn>
+              <a:cxn ang="0">
+                <a:pos x="connsiteX2" y="connsiteY2"/>
+              </a:cxn>
+              <a:cxn ang="0">
+                <a:pos x="connsiteX3" y="connsiteY3"/>
+              </a:cxn>
+            </a:cxnLst>
+            <a:rect l="l" t="t" r="r" b="b"/>
+            <a:pathLst>
+              <a:path w="5292749" h="4510186">
+                <a:moveTo>
+                  <a:pt x="2759623" y="0"/>
+                </a:moveTo>
+                <a:lnTo>
+                  <a:pt x="0" y="3979998"/>
+                </a:lnTo>
+                <a:lnTo>
+                  <a:pt x="5292749" y="4510186"/>
+                </a:lnTo>
+                <a:lnTo>
+                  <a:pt x="2759623" y="0"/>
+                </a:lnTo>
+                <a:close/>
+              </a:path>
+            </a:pathLst>
+          </a:custGeom>
+          <a:solidFill>
+            <a:schemeClr val="accent1">
+              <a:lumMod val="60000"/>
+              <a:lumOff val="40000"/>
+              <a:alpha val="15000"/>
+            </a:schemeClr>
+          </a:solidFill>
+          <a:ln>
+            <a:noFill/>
+          </a:ln>
+        </p:spPr>
+        <p:style>
+          <a:lnRef idx="2">
+            <a:schemeClr val="accent1">
+              <a:shade val="50000"/>
+            </a:schemeClr>
+          </a:lnRef>
+          <a:fillRef idx="1">
+            <a:schemeClr val="accent1"/>
+          </a:fillRef>
+          <a:effectRef idx="0">
+            <a:schemeClr val="accent1"/>
+          </a:effectRef>
+          <a:fontRef idx="minor">
+            <a:schemeClr val="lt1"/>
+          </a:fontRef>
+        </p:style>
+        <p:txBody>
+          <a:bodyPr rtlCol="0" anchor="ctr"/>
+          <a:lstStyle/>
+          <a:p>
+            <a:pPr algn="ctr"/>
+            <a:endParaRPr lang="en-GB"/>
+          </a:p>
+        </p:txBody>
+      </p:sp>
       <mc:AlternateContent xmlns:mc="http://schemas.openxmlformats.org/markup-compatibility/2006">
         <mc:Choice xmlns:pslz="http://schemas.microsoft.com/office/powerpoint/2016/slidezoom" Requires="pslz">
           <p:graphicFrame>
@@ -3117,13 +3394,13 @@
               <p:nvPr>
                 <p:extLst>
                   <p:ext uri="{D42A27DB-BD31-4B8C-83A1-F6EECF244321}">
-                    <p14:modId xmlns:p14="http://schemas.microsoft.com/office/powerpoint/2010/main" val="981414800"/>
+                    <p14:modId xmlns:p14="http://schemas.microsoft.com/office/powerpoint/2010/main" val="2523852954"/>
                   </p:ext>
                 </p:extLst>
               </p:nvPr>
             </p:nvGraphicFramePr>
             <p:xfrm>
-              <a:off x="701243" y="2609849"/>
+              <a:off x="512053" y="2483723"/>
               <a:ext cx="4320000" cy="4320000"/>
             </p:xfrm>
             <a:graphic>
@@ -3177,7 +3454,7 @@
             </p:blipFill>
             <p:spPr>
               <a:xfrm>
-                <a:off x="701243" y="2609849"/>
+                <a:off x="512053" y="2483723"/>
                 <a:ext cx="4320000" cy="4320000"/>
               </a:xfrm>
               <a:prstGeom prst="rect">
@@ -3204,13 +3481,13 @@
               <p:nvPr>
                 <p:extLst>
                   <p:ext uri="{D42A27DB-BD31-4B8C-83A1-F6EECF244321}">
-                    <p14:modId xmlns:p14="http://schemas.microsoft.com/office/powerpoint/2010/main" val="1052895221"/>
+                    <p14:modId xmlns:p14="http://schemas.microsoft.com/office/powerpoint/2010/main" val="3558790636"/>
                   </p:ext>
                 </p:extLst>
               </p:nvPr>
             </p:nvGraphicFramePr>
             <p:xfrm>
-              <a:off x="3383600" y="3004826"/>
+              <a:off x="3714679" y="2752575"/>
               <a:ext cx="4320000" cy="4320000"/>
             </p:xfrm>
             <a:graphic>
@@ -3264,7 +3541,7 @@
             </p:blipFill>
             <p:spPr>
               <a:xfrm>
-                <a:off x="3383600" y="3004826"/>
+                <a:off x="3714679" y="2752575"/>
                 <a:ext cx="4320000" cy="4320000"/>
               </a:xfrm>
               <a:prstGeom prst="rect">
@@ -3291,13 +3568,13 @@
               <p:nvPr>
                 <p:extLst>
                   <p:ext uri="{D42A27DB-BD31-4B8C-83A1-F6EECF244321}">
-                    <p14:modId xmlns:p14="http://schemas.microsoft.com/office/powerpoint/2010/main" val="1902366727"/>
+                    <p14:modId xmlns:p14="http://schemas.microsoft.com/office/powerpoint/2010/main" val="540785825"/>
                   </p:ext>
                 </p:extLst>
               </p:nvPr>
             </p:nvGraphicFramePr>
             <p:xfrm>
-              <a:off x="2068890" y="712410"/>
+              <a:off x="2179252" y="365563"/>
               <a:ext cx="4320000" cy="4320000"/>
             </p:xfrm>
             <a:graphic>
@@ -3351,7 +3628,7 @@
             </p:blipFill>
             <p:spPr>
               <a:xfrm>
-                <a:off x="2068890" y="712410"/>
+                <a:off x="2179252" y="365563"/>
                 <a:ext cx="4320000" cy="4320000"/>
               </a:xfrm>
               <a:prstGeom prst="rect">
@@ -3378,7 +3655,7 @@
               <p:nvPr>
                 <p:extLst>
                   <p:ext uri="{D42A27DB-BD31-4B8C-83A1-F6EECF244321}">
-                    <p14:modId xmlns:p14="http://schemas.microsoft.com/office/powerpoint/2010/main" val="3850543828"/>
+                    <p14:modId xmlns:p14="http://schemas.microsoft.com/office/powerpoint/2010/main" val="3850708360"/>
                   </p:ext>
                 </p:extLst>
               </p:nvPr>
@@ -3450,10 +3727,10 @@
       </mc:AlternateContent>
       <p:sp>
         <p:nvSpPr>
-          <p:cNvPr id="3" name="Freeform 2">
+          <p:cNvPr id="10" name="Freeform 9">
             <a:extLst>
               <a:ext uri="{FF2B5EF4-FFF2-40B4-BE49-F238E27FC236}">
-                <a16:creationId xmlns:a16="http://schemas.microsoft.com/office/drawing/2014/main" id="{5C7DEADA-E4D9-06D4-9741-E80FE82CE583}"/>
+                <a16:creationId xmlns:a16="http://schemas.microsoft.com/office/drawing/2014/main" id="{3B8703BC-9153-1AD6-C8BB-CE9DEF45256A}"/>
               </a:ext>
             </a:extLst>
           </p:cNvPr>
@@ -3462,8 +3739,8 @@
         </p:nvSpPr>
         <p:spPr>
           <a:xfrm>
-            <a:off x="3560609" y="1408141"/>
-            <a:ext cx="3192888" cy="6819640"/>
+            <a:off x="3547404" y="729038"/>
+            <a:ext cx="3878502" cy="7518549"/>
           </a:xfrm>
           <a:custGeom>
             <a:avLst/>
@@ -3508,6 +3785,38 @@
               <a:gd name="connsiteY2" fmla="*/ 6819640 h 6819640"/>
               <a:gd name="connsiteX3" fmla="*/ 3192888 w 3192888"/>
               <a:gd name="connsiteY3" fmla="*/ 4600775 h 6819640"/>
+              <a:gd name="connsiteX0" fmla="*/ 3192888 w 3192888"/>
+              <a:gd name="connsiteY0" fmla="*/ 4511808 h 6730673"/>
+              <a:gd name="connsiteX1" fmla="*/ 680551 w 3192888"/>
+              <a:gd name="connsiteY1" fmla="*/ 0 h 6730673"/>
+              <a:gd name="connsiteX2" fmla="*/ 0 w 3192888"/>
+              <a:gd name="connsiteY2" fmla="*/ 6730673 h 6730673"/>
+              <a:gd name="connsiteX3" fmla="*/ 3192888 w 3192888"/>
+              <a:gd name="connsiteY3" fmla="*/ 4511808 h 6730673"/>
+              <a:gd name="connsiteX0" fmla="*/ 3332338 w 3332338"/>
+              <a:gd name="connsiteY0" fmla="*/ 4286424 h 6730673"/>
+              <a:gd name="connsiteX1" fmla="*/ 680551 w 3332338"/>
+              <a:gd name="connsiteY1" fmla="*/ 0 h 6730673"/>
+              <a:gd name="connsiteX2" fmla="*/ 0 w 3332338"/>
+              <a:gd name="connsiteY2" fmla="*/ 6730673 h 6730673"/>
+              <a:gd name="connsiteX3" fmla="*/ 3332338 w 3332338"/>
+              <a:gd name="connsiteY3" fmla="*/ 4286424 h 6730673"/>
+              <a:gd name="connsiteX0" fmla="*/ 3343722 w 3343722"/>
+              <a:gd name="connsiteY0" fmla="*/ 4286424 h 6748466"/>
+              <a:gd name="connsiteX1" fmla="*/ 691935 w 3343722"/>
+              <a:gd name="connsiteY1" fmla="*/ 0 h 6748466"/>
+              <a:gd name="connsiteX2" fmla="*/ 0 w 3343722"/>
+              <a:gd name="connsiteY2" fmla="*/ 6748466 h 6748466"/>
+              <a:gd name="connsiteX3" fmla="*/ 3343722 w 3343722"/>
+              <a:gd name="connsiteY3" fmla="*/ 4286424 h 6748466"/>
+              <a:gd name="connsiteX0" fmla="*/ 3343722 w 3343722"/>
+              <a:gd name="connsiteY0" fmla="*/ 4292355 h 6754397"/>
+              <a:gd name="connsiteX1" fmla="*/ 697628 w 3343722"/>
+              <a:gd name="connsiteY1" fmla="*/ 0 h 6754397"/>
+              <a:gd name="connsiteX2" fmla="*/ 0 w 3343722"/>
+              <a:gd name="connsiteY2" fmla="*/ 6754397 h 6754397"/>
+              <a:gd name="connsiteX3" fmla="*/ 3343722 w 3343722"/>
+              <a:gd name="connsiteY3" fmla="*/ 4292355 h 6754397"/>
             </a:gdLst>
             <a:ahLst/>
             <a:cxnLst>
@@ -3526,18 +3835,18 @@
             </a:cxnLst>
             <a:rect l="l" t="t" r="r" b="b"/>
             <a:pathLst>
-              <a:path w="3192888" h="6819640">
+              <a:path w="3343722" h="6754397">
                 <a:moveTo>
-                  <a:pt x="3192888" y="4600775"/>
+                  <a:pt x="3343722" y="4292355"/>
                 </a:moveTo>
                 <a:lnTo>
-                  <a:pt x="583789" y="0"/>
+                  <a:pt x="697628" y="0"/>
                 </a:lnTo>
                 <a:lnTo>
-                  <a:pt x="0" y="6819640"/>
+                  <a:pt x="0" y="6754397"/>
                 </a:lnTo>
                 <a:lnTo>
-                  <a:pt x="3192888" y="4600775"/>
+                  <a:pt x="3343722" y="4292355"/>
                 </a:lnTo>
                 <a:close/>
               </a:path>
@@ -3545,13 +3854,11 @@
           </a:custGeom>
           <a:solidFill>
             <a:srgbClr val="C00000">
-              <a:alpha val="8000"/>
+              <a:alpha val="5000"/>
             </a:srgbClr>
           </a:solidFill>
           <a:ln>
-            <a:solidFill>
-              <a:schemeClr val="tx1"/>
-            </a:solidFill>
+            <a:noFill/>
             <a:round/>
           </a:ln>
         </p:spPr>
@@ -3582,10 +3889,10 @@
       </p:sp>
       <p:sp>
         <p:nvSpPr>
-          <p:cNvPr id="4" name="Freeform 3">
+          <p:cNvPr id="12" name="Freeform 11">
             <a:extLst>
               <a:ext uri="{FF2B5EF4-FFF2-40B4-BE49-F238E27FC236}">
-                <a16:creationId xmlns:a16="http://schemas.microsoft.com/office/drawing/2014/main" id="{A2E56233-A704-395D-05B3-9F0E695855BD}"/>
+                <a16:creationId xmlns:a16="http://schemas.microsoft.com/office/drawing/2014/main" id="{BD3DD317-603F-DF58-EFF6-FBE568143401}"/>
               </a:ext>
             </a:extLst>
           </p:cNvPr>
@@ -3594,8 +3901,8 @@
         </p:nvSpPr>
         <p:spPr>
           <a:xfrm>
-            <a:off x="1410787" y="1404942"/>
-            <a:ext cx="2736806" cy="6819881"/>
+            <a:off x="1026611" y="741367"/>
+            <a:ext cx="3324181" cy="7505681"/>
           </a:xfrm>
           <a:custGeom>
             <a:avLst/>
@@ -3656,6 +3963,30 @@
               <a:gd name="connsiteY2" fmla="*/ 6819881 h 6819881"/>
               <a:gd name="connsiteX3" fmla="*/ 0 w 2736806"/>
               <a:gd name="connsiteY3" fmla="*/ 3820476 h 6819881"/>
+              <a:gd name="connsiteX0" fmla="*/ 0 w 2940006"/>
+              <a:gd name="connsiteY0" fmla="*/ 4484051 h 7483456"/>
+              <a:gd name="connsiteX1" fmla="*/ 2940006 w 2940006"/>
+              <a:gd name="connsiteY1" fmla="*/ 0 h 7483456"/>
+              <a:gd name="connsiteX2" fmla="*/ 2152984 w 2940006"/>
+              <a:gd name="connsiteY2" fmla="*/ 7483456 h 7483456"/>
+              <a:gd name="connsiteX3" fmla="*/ 0 w 2940006"/>
+              <a:gd name="connsiteY3" fmla="*/ 4484051 h 7483456"/>
+              <a:gd name="connsiteX0" fmla="*/ 0 w 2940006"/>
+              <a:gd name="connsiteY0" fmla="*/ 4484051 h 7505681"/>
+              <a:gd name="connsiteX1" fmla="*/ 2940006 w 2940006"/>
+              <a:gd name="connsiteY1" fmla="*/ 0 h 7505681"/>
+              <a:gd name="connsiteX2" fmla="*/ 2137109 w 2940006"/>
+              <a:gd name="connsiteY2" fmla="*/ 7505681 h 7505681"/>
+              <a:gd name="connsiteX3" fmla="*/ 0 w 2940006"/>
+              <a:gd name="connsiteY3" fmla="*/ 4484051 h 7505681"/>
+              <a:gd name="connsiteX0" fmla="*/ 0 w 3324181"/>
+              <a:gd name="connsiteY0" fmla="*/ 4217351 h 7505681"/>
+              <a:gd name="connsiteX1" fmla="*/ 3324181 w 3324181"/>
+              <a:gd name="connsiteY1" fmla="*/ 0 h 7505681"/>
+              <a:gd name="connsiteX2" fmla="*/ 2521284 w 3324181"/>
+              <a:gd name="connsiteY2" fmla="*/ 7505681 h 7505681"/>
+              <a:gd name="connsiteX3" fmla="*/ 0 w 3324181"/>
+              <a:gd name="connsiteY3" fmla="*/ 4217351 h 7505681"/>
             </a:gdLst>
             <a:ahLst/>
             <a:cxnLst>
@@ -3674,32 +4005,30 @@
             </a:cxnLst>
             <a:rect l="l" t="t" r="r" b="b"/>
             <a:pathLst>
-              <a:path w="2736806" h="6819881">
+              <a:path w="3324181" h="7505681">
                 <a:moveTo>
-                  <a:pt x="0" y="3820476"/>
+                  <a:pt x="0" y="4217351"/>
                 </a:moveTo>
                 <a:lnTo>
-                  <a:pt x="2736806" y="0"/>
+                  <a:pt x="3324181" y="0"/>
                 </a:lnTo>
                 <a:lnTo>
-                  <a:pt x="2152984" y="6819881"/>
+                  <a:pt x="2521284" y="7505681"/>
                 </a:lnTo>
                 <a:lnTo>
-                  <a:pt x="0" y="3820476"/>
+                  <a:pt x="0" y="4217351"/>
                 </a:lnTo>
                 <a:close/>
               </a:path>
             </a:pathLst>
           </a:custGeom>
           <a:solidFill>
-            <a:srgbClr val="FFFF00">
+            <a:srgbClr val="FFC000">
               <a:alpha val="10000"/>
             </a:srgbClr>
           </a:solidFill>
           <a:ln>
-            <a:solidFill>
-              <a:schemeClr val="tx1"/>
-            </a:solidFill>
+            <a:noFill/>
             <a:round/>
           </a:ln>
         </p:spPr>
@@ -3724,7 +4053,7 @@
           <a:lstStyle/>
           <a:p>
             <a:pPr algn="ctr"/>
-            <a:endParaRPr lang="en-GB"/>
+            <a:endParaRPr lang="en-GB" dirty="0"/>
           </a:p>
         </p:txBody>
       </p:sp>

</xml_diff>